<commit_message>
Updating graphs to only contain stan4bart and 2l.pmm
</commit_message>
<xml_diff>
--- a/defensepresentation/MSc thesis defense Heleen Brüggen 6474292.pptx
+++ b/defensepresentation/MSc thesis defense Heleen Brüggen 6474292.pptx
@@ -1730,7 +1730,11 @@
           <dgm:bulletEnabled val="1"/>
         </dgm:presLayoutVars>
       </dgm:prSet>
-      <dgm:spPr/>
+      <dgm:spPr>
+        <a:prstGeom prst="roundRect">
+          <a:avLst/>
+        </a:prstGeom>
+      </dgm:spPr>
     </dgm:pt>
   </dgm:ptLst>
   <dgm:cxnLst>
@@ -2073,10 +2077,10 @@
       </dsp:nvSpPr>
       <dsp:spPr>
         <a:xfrm rot="16200000">
-          <a:off x="5533227" y="-4480568"/>
-          <a:ext cx="4828809" cy="14551719"/>
+          <a:off x="5533227" y="-4487680"/>
+          <a:ext cx="4828809" cy="14565943"/>
         </a:xfrm>
-        <a:prstGeom prst="flowChartManualOperation">
+        <a:prstGeom prst="roundRect">
           <a:avLst/>
         </a:prstGeom>
         <a:solidFill>
@@ -2146,8 +2150,8 @@
         </a:p>
       </dsp:txBody>
       <dsp:txXfrm rot="5400000">
-        <a:off x="671772" y="1346649"/>
-        <a:ext cx="14551719" cy="2897285"/>
+        <a:off x="900383" y="616610"/>
+        <a:ext cx="14094497" cy="4357363"/>
       </dsp:txXfrm>
     </dsp:sp>
   </dsp:spTree>
@@ -6147,7 +6151,7 @@
           <a:p>
             <a:fld id="{B7268E1E-0E44-426D-905E-8AD9B19D2182}" type="datetimeFigureOut">
               <a:rPr lang="cs-CZ" smtClean="0"/>
-              <a:t>24.05.2024</a:t>
+              <a:t>26.05.2024</a:t>
             </a:fld>
             <a:endParaRPr lang="cs-CZ"/>
           </a:p>
@@ -6554,20 +6558,28 @@
           <a:lstStyle/>
           <a:p>
             <a:r>
-              <a:rPr lang="en-US"/>
+              <a:rPr lang="en-US" dirty="0"/>
               <a:t>Introduce thesis: </a:t>
             </a:r>
           </a:p>
           <a:p>
             <a:r>
-              <a:rPr lang="en-US"/>
+              <a:rPr lang="en-US" dirty="0"/>
               <a:t>- Multilevel MICE through BART </a:t>
             </a:r>
           </a:p>
           <a:p>
             <a:r>
-              <a:rPr lang="en-US"/>
-              <a:t>- BART --&gt; non-parametirc sum-of-regression-trees model </a:t>
+              <a:rPr lang="en-US" dirty="0"/>
+              <a:t>- BART --&gt; non-</a:t>
+            </a:r>
+            <a:r>
+              <a:rPr lang="en-US" dirty="0" err="1"/>
+              <a:t>parametirc</a:t>
+            </a:r>
+            <a:r>
+              <a:rPr lang="en-US" dirty="0"/>
+              <a:t> sum-of-regression-trees model </a:t>
             </a:r>
           </a:p>
         </p:txBody>
@@ -7238,8 +7250,8 @@
         </p:nvSpPr>
         <p:spPr>
           <a:xfrm>
-            <a:off x="2857500" y="512763"/>
-            <a:ext cx="3429000" cy="2566987"/>
+            <a:off x="2290763" y="512763"/>
+            <a:ext cx="4562475" cy="2566987"/>
           </a:xfrm>
           <a:prstGeom prst="rect">
             <a:avLst/>
@@ -7498,8 +7510,8 @@
         </p:nvSpPr>
         <p:spPr>
           <a:xfrm>
-            <a:off x="2857500" y="512763"/>
-            <a:ext cx="3429000" cy="2566987"/>
+            <a:off x="2290763" y="512763"/>
+            <a:ext cx="4562475" cy="2566987"/>
           </a:xfrm>
           <a:prstGeom prst="rect">
             <a:avLst/>
@@ -7761,130 +7773,138 @@
           <a:lstStyle/>
           <a:p>
             <a:r>
-              <a:rPr lang="en-US"/>
+              <a:rPr lang="en-US" dirty="0"/>
               <a:t>data generating mechanism:</a:t>
             </a:r>
           </a:p>
           <a:p>
             <a:r>
-              <a:rPr lang="en-US"/>
-              <a:t>- 7  level-2</a:t>
+              <a:rPr lang="en-US" dirty="0"/>
+              <a:t>- 7  level-1</a:t>
             </a:r>
           </a:p>
           <a:p>
             <a:r>
-              <a:rPr lang="en-US"/>
+              <a:rPr lang="en-US" dirty="0"/>
               <a:t>- 2 level-2 </a:t>
             </a:r>
           </a:p>
           <a:p>
             <a:r>
-              <a:rPr lang="en-US"/>
+              <a:rPr lang="en-US" dirty="0"/>
               <a:t>- cross-level interactions </a:t>
             </a:r>
           </a:p>
           <a:p>
             <a:r>
-              <a:rPr lang="en-US"/>
+              <a:rPr lang="en-US" dirty="0"/>
               <a:t>- random intercept</a:t>
             </a:r>
           </a:p>
           <a:p>
             <a:r>
-              <a:rPr lang="en-US"/>
+              <a:rPr lang="en-US" dirty="0"/>
               <a:t>- 3 random slopes </a:t>
             </a:r>
           </a:p>
           <a:p>
             <a:r>
-              <a:rPr lang="en-US"/>
+              <a:rPr lang="en-US" dirty="0"/>
               <a:t>- residual variance </a:t>
             </a:r>
           </a:p>
           <a:p>
-            <a:endParaRPr lang="en-US"/>
+            <a:endParaRPr lang="en-US" dirty="0"/>
           </a:p>
           <a:p>
             <a:r>
-              <a:rPr lang="en-US"/>
+              <a:rPr lang="en-US" dirty="0"/>
               <a:t>simulation design:  </a:t>
             </a:r>
           </a:p>
           <a:p>
             <a:r>
-              <a:rPr lang="en-US"/>
+              <a:rPr lang="en-US" dirty="0"/>
               <a:t>- 30/50 groups </a:t>
             </a:r>
           </a:p>
           <a:p>
             <a:r>
-              <a:rPr lang="en-US"/>
-              <a:t>- 15/50 groupsize </a:t>
+              <a:rPr lang="en-US" dirty="0"/>
+              <a:t>- 15/50 </a:t>
             </a:r>
-          </a:p>
-          <a:p>
             <a:r>
-              <a:rPr lang="en-US"/>
+              <a:rPr lang="en-US" dirty="0" err="1"/>
+              <a:t>groupsize</a:t>
+            </a:r>
+            <a:r>
+              <a:rPr lang="en-US" dirty="0"/>
+              <a:t> </a:t>
+            </a:r>
+          </a:p>
+          <a:p>
+            <a:r>
+              <a:rPr lang="en-US" dirty="0"/>
               <a:t>- 0% or 50% missing </a:t>
             </a:r>
           </a:p>
           <a:p>
             <a:r>
-              <a:rPr lang="en-US"/>
+              <a:rPr lang="en-US" dirty="0"/>
               <a:t>- MCAR or MAR </a:t>
             </a:r>
           </a:p>
           <a:p>
             <a:r>
-              <a:rPr lang="en-US"/>
+              <a:rPr lang="en-US" dirty="0"/>
               <a:t>- .5 ICC </a:t>
             </a:r>
           </a:p>
           <a:p>
             <a:r>
-              <a:rPr lang="en-US"/>
+              <a:rPr lang="en-US" dirty="0"/>
               <a:t>- 100 data sets</a:t>
             </a:r>
           </a:p>
           <a:p>
-            <a:endParaRPr lang="en-US"/>
+            <a:endParaRPr lang="en-US" dirty="0"/>
           </a:p>
           <a:p>
             <a:r>
-              <a:rPr lang="en-US"/>
+              <a:rPr lang="en-US" dirty="0"/>
               <a:t>missing data generation: </a:t>
             </a:r>
           </a:p>
           <a:p>
             <a:r>
-              <a:rPr lang="en-US"/>
+              <a:rPr lang="en-US" dirty="0"/>
               <a:t>- 50% --&gt; 50% of people had one to 5 missing values</a:t>
             </a:r>
           </a:p>
           <a:p>
-            <a:endParaRPr lang="en-US"/>
+            <a:endParaRPr lang="en-US" dirty="0"/>
           </a:p>
           <a:p>
             <a:r>
-              <a:rPr lang="en-US"/>
+              <a:rPr lang="en-US" dirty="0"/>
               <a:t>evaluation: </a:t>
             </a:r>
           </a:p>
           <a:p>
             <a:r>
-              <a:rPr lang="en-US"/>
+              <a:rPr lang="en-US" dirty="0"/>
               <a:t>- absolute bias </a:t>
             </a:r>
           </a:p>
           <a:p>
             <a:r>
-              <a:rPr lang="en-US"/>
+              <a:rPr lang="en-US" dirty="0"/>
               <a:t>- coverage</a:t>
             </a:r>
           </a:p>
           <a:p>
             <a:r>
-              <a:rPr lang="en-US"/>
+              <a:rPr lang="en-US" dirty="0"/>
               <a:t>- confidence interval width</a:t>
             </a:r>
           </a:p>
@@ -8102,34 +8122,34 @@
           <a:lstStyle/>
           <a:p>
             <a:r>
-              <a:rPr lang="en-US"/>
+              <a:rPr lang="en-US" dirty="0"/>
               <a:t>Limitations: </a:t>
             </a:r>
           </a:p>
           <a:p>
-            <a:endParaRPr lang="en-US"/>
+            <a:endParaRPr lang="en-US" dirty="0"/>
           </a:p>
           <a:p>
             <a:r>
-              <a:rPr lang="en-US"/>
+              <a:rPr lang="en-US" dirty="0"/>
               <a:t>- Amount of repetitions: only 100 data sets --&gt;  95% confidence interval coverage estimates are variable</a:t>
             </a:r>
           </a:p>
           <a:p>
-            <a:endParaRPr lang="en-US"/>
+            <a:endParaRPr lang="en-US" dirty="0"/>
           </a:p>
           <a:p>
             <a:r>
-              <a:rPr lang="en-US"/>
+              <a:rPr lang="en-US" dirty="0"/>
               <a:t>- listwise deletion seemed to suggest a special case was generated --&gt; methods were not evaluated with a strong MAR mechanism</a:t>
             </a:r>
           </a:p>
           <a:p>
-            <a:endParaRPr lang="en-US"/>
+            <a:endParaRPr lang="en-US" dirty="0"/>
           </a:p>
           <a:p>
             <a:r>
-              <a:rPr lang="en-US"/>
+              <a:rPr lang="en-US" dirty="0"/>
               <a:t>- ICC was only .5, amount of missingness only 50%, and limited number of groups and their sizes</a:t>
             </a:r>
           </a:p>
@@ -8393,7 +8413,7 @@
             <a:fld id="{1D8BD707-D9CF-40AE-B4C6-C98DA3205C09}" type="datetimeFigureOut">
               <a:rPr lang="en-US" smtClean="0"/>
               <a:pPr/>
-              <a:t>5/24/24</a:t>
+              <a:t>5/26/24</a:t>
             </a:fld>
             <a:endParaRPr lang="en-US"/>
           </a:p>
@@ -8558,7 +8578,7 @@
             <a:fld id="{1D8BD707-D9CF-40AE-B4C6-C98DA3205C09}" type="datetimeFigureOut">
               <a:rPr lang="en-US" smtClean="0"/>
               <a:pPr/>
-              <a:t>5/24/24</a:t>
+              <a:t>5/26/24</a:t>
             </a:fld>
             <a:endParaRPr lang="en-US"/>
           </a:p>
@@ -8733,7 +8753,7 @@
             <a:fld id="{1D8BD707-D9CF-40AE-B4C6-C98DA3205C09}" type="datetimeFigureOut">
               <a:rPr lang="en-US" smtClean="0"/>
               <a:pPr/>
-              <a:t>5/24/24</a:t>
+              <a:t>5/26/24</a:t>
             </a:fld>
             <a:endParaRPr lang="en-US"/>
           </a:p>
@@ -8898,7 +8918,7 @@
             <a:fld id="{1D8BD707-D9CF-40AE-B4C6-C98DA3205C09}" type="datetimeFigureOut">
               <a:rPr lang="en-US" smtClean="0"/>
               <a:pPr/>
-              <a:t>5/24/24</a:t>
+              <a:t>5/26/24</a:t>
             </a:fld>
             <a:endParaRPr lang="en-US"/>
           </a:p>
@@ -9140,7 +9160,7 @@
             <a:fld id="{1D8BD707-D9CF-40AE-B4C6-C98DA3205C09}" type="datetimeFigureOut">
               <a:rPr lang="en-US" smtClean="0"/>
               <a:pPr/>
-              <a:t>5/24/24</a:t>
+              <a:t>5/26/24</a:t>
             </a:fld>
             <a:endParaRPr lang="en-US"/>
           </a:p>
@@ -9422,7 +9442,7 @@
             <a:fld id="{1D8BD707-D9CF-40AE-B4C6-C98DA3205C09}" type="datetimeFigureOut">
               <a:rPr lang="en-US" smtClean="0"/>
               <a:pPr/>
-              <a:t>5/24/24</a:t>
+              <a:t>5/26/24</a:t>
             </a:fld>
             <a:endParaRPr lang="en-US"/>
           </a:p>
@@ -9838,7 +9858,7 @@
             <a:fld id="{1D8BD707-D9CF-40AE-B4C6-C98DA3205C09}" type="datetimeFigureOut">
               <a:rPr lang="en-US" smtClean="0"/>
               <a:pPr/>
-              <a:t>5/24/24</a:t>
+              <a:t>5/26/24</a:t>
             </a:fld>
             <a:endParaRPr lang="en-US"/>
           </a:p>
@@ -9952,7 +9972,7 @@
             <a:fld id="{1D8BD707-D9CF-40AE-B4C6-C98DA3205C09}" type="datetimeFigureOut">
               <a:rPr lang="en-US" smtClean="0"/>
               <a:pPr/>
-              <a:t>5/24/24</a:t>
+              <a:t>5/26/24</a:t>
             </a:fld>
             <a:endParaRPr lang="en-US"/>
           </a:p>
@@ -10044,7 +10064,7 @@
             <a:fld id="{1D8BD707-D9CF-40AE-B4C6-C98DA3205C09}" type="datetimeFigureOut">
               <a:rPr lang="en-US" smtClean="0"/>
               <a:pPr/>
-              <a:t>5/24/24</a:t>
+              <a:t>5/26/24</a:t>
             </a:fld>
             <a:endParaRPr lang="en-US"/>
           </a:p>
@@ -10316,7 +10336,7 @@
             <a:fld id="{1D8BD707-D9CF-40AE-B4C6-C98DA3205C09}" type="datetimeFigureOut">
               <a:rPr lang="en-US" smtClean="0"/>
               <a:pPr/>
-              <a:t>5/24/24</a:t>
+              <a:t>5/26/24</a:t>
             </a:fld>
             <a:endParaRPr lang="en-US"/>
           </a:p>
@@ -10565,7 +10585,7 @@
             <a:fld id="{1D8BD707-D9CF-40AE-B4C6-C98DA3205C09}" type="datetimeFigureOut">
               <a:rPr lang="en-US" smtClean="0"/>
               <a:pPr/>
-              <a:t>5/24/24</a:t>
+              <a:t>5/26/24</a:t>
             </a:fld>
             <a:endParaRPr lang="en-US"/>
           </a:p>
@@ -10773,7 +10793,7 @@
             <a:fld id="{1D8BD707-D9CF-40AE-B4C6-C98DA3205C09}" type="datetimeFigureOut">
               <a:rPr lang="en-US" smtClean="0"/>
               <a:pPr/>
-              <a:t>5/24/24</a:t>
+              <a:t>5/26/24</a:t>
             </a:fld>
             <a:endParaRPr lang="en-US"/>
           </a:p>
@@ -12478,7 +12498,7 @@
           <p:nvPr>
             <p:extLst>
               <p:ext uri="{D42A27DB-BD31-4B8C-83A1-F6EECF244321}">
-                <p14:modId xmlns:p14="http://schemas.microsoft.com/office/powerpoint/2010/main" val="3518161122"/>
+                <p14:modId xmlns:p14="http://schemas.microsoft.com/office/powerpoint/2010/main" val="3321149145"/>
               </p:ext>
             </p:extLst>
           </p:nvPr>
@@ -12746,124 +12766,24 @@
       </p:sp>
       <p:grpSp>
         <p:nvGrpSpPr>
-          <p:cNvPr id="6" name="Group 6"/>
+          <p:cNvPr id="15" name="Groep 14">
+            <a:extLst>
+              <a:ext uri="{FF2B5EF4-FFF2-40B4-BE49-F238E27FC236}">
+                <a16:creationId xmlns:a16="http://schemas.microsoft.com/office/drawing/2014/main" id="{6A629A05-7B9B-5439-C265-EAC9C70095D1}"/>
+              </a:ext>
+            </a:extLst>
+          </p:cNvPr>
           <p:cNvGrpSpPr/>
           <p:nvPr/>
         </p:nvGrpSpPr>
         <p:grpSpPr>
           <a:xfrm>
-            <a:off x="285898" y="1388617"/>
-            <a:ext cx="11625176" cy="8898383"/>
-            <a:chOff x="0" y="0"/>
-            <a:chExt cx="15500235" cy="11864510"/>
+            <a:off x="285898" y="1360042"/>
+            <a:ext cx="10686902" cy="8926958"/>
+            <a:chOff x="285898" y="1360042"/>
+            <a:chExt cx="10281046" cy="8444211"/>
           </a:xfrm>
         </p:grpSpPr>
-        <p:sp>
-          <p:nvSpPr>
-            <p:cNvPr id="7" name="Freeform 7"/>
-            <p:cNvSpPr/>
-            <p:nvPr/>
-          </p:nvSpPr>
-          <p:spPr>
-            <a:xfrm>
-              <a:off x="0" y="5128367"/>
-              <a:ext cx="15500235" cy="6736144"/>
-            </a:xfrm>
-            <a:custGeom>
-              <a:avLst/>
-              <a:gdLst/>
-              <a:ahLst/>
-              <a:cxnLst/>
-              <a:rect l="l" t="t" r="r" b="b"/>
-              <a:pathLst>
-                <a:path w="15500235" h="6736144">
-                  <a:moveTo>
-                    <a:pt x="0" y="0"/>
-                  </a:moveTo>
-                  <a:lnTo>
-                    <a:pt x="15500235" y="0"/>
-                  </a:lnTo>
-                  <a:lnTo>
-                    <a:pt x="15500235" y="6736143"/>
-                  </a:lnTo>
-                  <a:lnTo>
-                    <a:pt x="0" y="6736143"/>
-                  </a:lnTo>
-                  <a:lnTo>
-                    <a:pt x="0" y="0"/>
-                  </a:lnTo>
-                  <a:close/>
-                </a:path>
-              </a:pathLst>
-            </a:custGeom>
-            <a:blipFill>
-              <a:blip r:embed="rId9"/>
-              <a:stretch>
-                <a:fillRect/>
-              </a:stretch>
-            </a:blipFill>
-          </p:spPr>
-          <p:txBody>
-            <a:bodyPr/>
-            <a:lstStyle/>
-            <a:p>
-              <a:endParaRPr lang="nl-NL"/>
-            </a:p>
-          </p:txBody>
-        </p:sp>
-        <p:sp>
-          <p:nvSpPr>
-            <p:cNvPr id="8" name="Freeform 8"/>
-            <p:cNvSpPr/>
-            <p:nvPr/>
-          </p:nvSpPr>
-          <p:spPr>
-            <a:xfrm>
-              <a:off x="0" y="512531"/>
-              <a:ext cx="15500235" cy="4103276"/>
-            </a:xfrm>
-            <a:custGeom>
-              <a:avLst/>
-              <a:gdLst/>
-              <a:ahLst/>
-              <a:cxnLst/>
-              <a:rect l="l" t="t" r="r" b="b"/>
-              <a:pathLst>
-                <a:path w="15500235" h="4103276">
-                  <a:moveTo>
-                    <a:pt x="0" y="0"/>
-                  </a:moveTo>
-                  <a:lnTo>
-                    <a:pt x="15500235" y="0"/>
-                  </a:lnTo>
-                  <a:lnTo>
-                    <a:pt x="15500235" y="4103276"/>
-                  </a:lnTo>
-                  <a:lnTo>
-                    <a:pt x="0" y="4103276"/>
-                  </a:lnTo>
-                  <a:lnTo>
-                    <a:pt x="0" y="0"/>
-                  </a:lnTo>
-                  <a:close/>
-                </a:path>
-              </a:pathLst>
-            </a:custGeom>
-            <a:blipFill>
-              <a:blip r:embed="rId10"/>
-              <a:stretch>
-                <a:fillRect b="-47638"/>
-              </a:stretch>
-            </a:blipFill>
-          </p:spPr>
-          <p:txBody>
-            <a:bodyPr/>
-            <a:lstStyle/>
-            <a:p>
-              <a:endParaRPr lang="nl-NL"/>
-            </a:p>
-          </p:txBody>
-        </p:sp>
         <p:sp>
           <p:nvSpPr>
             <p:cNvPr id="9" name="TextBox 9"/>
@@ -12872,8 +12792,8 @@
           </p:nvSpPr>
           <p:spPr>
             <a:xfrm>
-              <a:off x="884030" y="-38100"/>
-              <a:ext cx="7719624" cy="550631"/>
+              <a:off x="948920" y="1360042"/>
+              <a:ext cx="5789718" cy="412973"/>
             </a:xfrm>
             <a:prstGeom prst="rect">
               <a:avLst/>
@@ -12913,8 +12833,8 @@
           </p:nvSpPr>
           <p:spPr>
             <a:xfrm>
-              <a:off x="884030" y="4577707"/>
-              <a:ext cx="7473658" cy="550660"/>
+              <a:off x="948920" y="4885915"/>
+              <a:ext cx="5605243" cy="412995"/>
             </a:xfrm>
             <a:prstGeom prst="rect">
               <a:avLst/>
@@ -12935,7 +12855,7 @@
                 </a:spcBef>
               </a:pPr>
               <a:r>
-                <a:rPr lang="en-US" sz="2565" u="sng" strike="noStrike">
+                <a:rPr lang="en-US" sz="2565" u="sng" strike="noStrike" dirty="0">
                   <a:solidFill>
                     <a:srgbClr val="000000"/>
                   </a:solidFill>
@@ -12946,6 +12866,77 @@
             </a:p>
           </p:txBody>
         </p:sp>
+        <p:pic>
+          <p:nvPicPr>
+            <p:cNvPr id="12" name="Afbeelding 11" descr="Afbeelding met schermopname, lijn&#10;&#10;Automatisch gegenereerde beschrijving">
+              <a:extLst>
+                <a:ext uri="{FF2B5EF4-FFF2-40B4-BE49-F238E27FC236}">
+                  <a16:creationId xmlns:a16="http://schemas.microsoft.com/office/drawing/2014/main" id="{78A21C2E-1E1C-D12E-12C3-E238E55AF845}"/>
+                </a:ext>
+              </a:extLst>
+            </p:cNvPr>
+            <p:cNvPicPr>
+              <a:picLocks noChangeAspect="1"/>
+            </p:cNvPicPr>
+            <p:nvPr/>
+          </p:nvPicPr>
+          <p:blipFill rotWithShape="1">
+            <a:blip r:embed="rId9">
+              <a:extLst>
+                <a:ext uri="{28A0092B-C50C-407E-A947-70E740481C1C}">
+                  <a14:useLocalDpi xmlns:a14="http://schemas.microsoft.com/office/drawing/2010/main" val="0"/>
+                </a:ext>
+              </a:extLst>
+            </a:blip>
+            <a:srcRect b="23866"/>
+            <a:stretch/>
+          </p:blipFill>
+          <p:spPr>
+            <a:xfrm>
+              <a:off x="285898" y="1801612"/>
+              <a:ext cx="10281046" cy="3054000"/>
+            </a:xfrm>
+            <a:prstGeom prst="rect">
+              <a:avLst/>
+            </a:prstGeom>
+          </p:spPr>
+        </p:pic>
+        <p:pic>
+          <p:nvPicPr>
+            <p:cNvPr id="14" name="Afbeelding 13" descr="Afbeelding met schermopname, ruimte, zwart&#10;&#10;Automatisch gegenereerde beschrijving">
+              <a:extLst>
+                <a:ext uri="{FF2B5EF4-FFF2-40B4-BE49-F238E27FC236}">
+                  <a16:creationId xmlns:a16="http://schemas.microsoft.com/office/drawing/2014/main" id="{C301B896-20EC-1086-7331-29DC86ECD7F6}"/>
+                </a:ext>
+              </a:extLst>
+            </p:cNvPr>
+            <p:cNvPicPr>
+              <a:picLocks noChangeAspect="1"/>
+            </p:cNvPicPr>
+            <p:nvPr/>
+          </p:nvPicPr>
+          <p:blipFill>
+            <a:blip r:embed="rId10">
+              <a:extLst>
+                <a:ext uri="{28A0092B-C50C-407E-A947-70E740481C1C}">
+                  <a14:useLocalDpi xmlns:a14="http://schemas.microsoft.com/office/drawing/2010/main" val="0"/>
+                </a:ext>
+              </a:extLst>
+            </a:blip>
+            <a:stretch>
+              <a:fillRect/>
+            </a:stretch>
+          </p:blipFill>
+          <p:spPr>
+            <a:xfrm>
+              <a:off x="288090" y="5335873"/>
+              <a:ext cx="10278854" cy="4468380"/>
+            </a:xfrm>
+            <a:prstGeom prst="rect">
+              <a:avLst/>
+            </a:prstGeom>
+          </p:spPr>
+        </p:pic>
       </p:grpSp>
     </p:spTree>
   </p:cSld>
@@ -13200,124 +13191,24 @@
       </p:sp>
       <p:grpSp>
         <p:nvGrpSpPr>
-          <p:cNvPr id="6" name="Group 6"/>
+          <p:cNvPr id="15" name="Groep 14">
+            <a:extLst>
+              <a:ext uri="{FF2B5EF4-FFF2-40B4-BE49-F238E27FC236}">
+                <a16:creationId xmlns:a16="http://schemas.microsoft.com/office/drawing/2014/main" id="{D5929CDC-DDE2-232E-8C61-1F9A4FB7E986}"/>
+              </a:ext>
+            </a:extLst>
+          </p:cNvPr>
           <p:cNvGrpSpPr/>
           <p:nvPr/>
         </p:nvGrpSpPr>
         <p:grpSpPr>
           <a:xfrm>
-            <a:off x="285898" y="1388617"/>
-            <a:ext cx="11559196" cy="8945157"/>
-            <a:chOff x="0" y="0"/>
-            <a:chExt cx="15412261" cy="11926877"/>
+            <a:off x="285899" y="1360042"/>
+            <a:ext cx="10839301" cy="8926958"/>
+            <a:chOff x="285899" y="1360042"/>
+            <a:chExt cx="10470695" cy="8522705"/>
           </a:xfrm>
         </p:grpSpPr>
-        <p:sp>
-          <p:nvSpPr>
-            <p:cNvPr id="7" name="Freeform 7"/>
-            <p:cNvSpPr/>
-            <p:nvPr/>
-          </p:nvSpPr>
-          <p:spPr>
-            <a:xfrm>
-              <a:off x="0" y="5903251"/>
-              <a:ext cx="15412261" cy="6023625"/>
-            </a:xfrm>
-            <a:custGeom>
-              <a:avLst/>
-              <a:gdLst/>
-              <a:ahLst/>
-              <a:cxnLst/>
-              <a:rect l="l" t="t" r="r" b="b"/>
-              <a:pathLst>
-                <a:path w="15412261" h="6023625">
-                  <a:moveTo>
-                    <a:pt x="0" y="0"/>
-                  </a:moveTo>
-                  <a:lnTo>
-                    <a:pt x="15412261" y="0"/>
-                  </a:lnTo>
-                  <a:lnTo>
-                    <a:pt x="15412261" y="6023626"/>
-                  </a:lnTo>
-                  <a:lnTo>
-                    <a:pt x="0" y="6023626"/>
-                  </a:lnTo>
-                  <a:lnTo>
-                    <a:pt x="0" y="0"/>
-                  </a:lnTo>
-                  <a:close/>
-                </a:path>
-              </a:pathLst>
-            </a:custGeom>
-            <a:blipFill>
-              <a:blip r:embed="rId9"/>
-              <a:stretch>
-                <a:fillRect/>
-              </a:stretch>
-            </a:blipFill>
-          </p:spPr>
-          <p:txBody>
-            <a:bodyPr/>
-            <a:lstStyle/>
-            <a:p>
-              <a:endParaRPr lang="nl-NL"/>
-            </a:p>
-          </p:txBody>
-        </p:sp>
-        <p:sp>
-          <p:nvSpPr>
-            <p:cNvPr id="8" name="Freeform 8"/>
-            <p:cNvSpPr/>
-            <p:nvPr/>
-          </p:nvSpPr>
-          <p:spPr>
-            <a:xfrm>
-              <a:off x="0" y="639288"/>
-              <a:ext cx="15412261" cy="4751403"/>
-            </a:xfrm>
-            <a:custGeom>
-              <a:avLst/>
-              <a:gdLst/>
-              <a:ahLst/>
-              <a:cxnLst/>
-              <a:rect l="l" t="t" r="r" b="b"/>
-              <a:pathLst>
-                <a:path w="15412261" h="4751403">
-                  <a:moveTo>
-                    <a:pt x="0" y="0"/>
-                  </a:moveTo>
-                  <a:lnTo>
-                    <a:pt x="15412261" y="0"/>
-                  </a:lnTo>
-                  <a:lnTo>
-                    <a:pt x="15412261" y="4751404"/>
-                  </a:lnTo>
-                  <a:lnTo>
-                    <a:pt x="0" y="4751404"/>
-                  </a:lnTo>
-                  <a:lnTo>
-                    <a:pt x="0" y="0"/>
-                  </a:lnTo>
-                  <a:close/>
-                </a:path>
-              </a:pathLst>
-            </a:custGeom>
-            <a:blipFill>
-              <a:blip r:embed="rId10"/>
-              <a:stretch>
-                <a:fillRect b="-40967"/>
-              </a:stretch>
-            </a:blipFill>
-          </p:spPr>
-          <p:txBody>
-            <a:bodyPr/>
-            <a:lstStyle/>
-            <a:p>
-              <a:endParaRPr lang="nl-NL"/>
-            </a:p>
-          </p:txBody>
-        </p:sp>
         <p:sp>
           <p:nvSpPr>
             <p:cNvPr id="9" name="TextBox 9"/>
@@ -13326,8 +13217,8 @@
           </p:nvSpPr>
           <p:spPr>
             <a:xfrm>
-              <a:off x="884030" y="-38100"/>
-              <a:ext cx="7719624" cy="550631"/>
+              <a:off x="948921" y="1360042"/>
+              <a:ext cx="5789718" cy="412973"/>
             </a:xfrm>
             <a:prstGeom prst="rect">
               <a:avLst/>
@@ -13367,8 +13258,8 @@
           </p:nvSpPr>
           <p:spPr>
             <a:xfrm>
-              <a:off x="884030" y="5352592"/>
-              <a:ext cx="9473151" cy="550660"/>
+              <a:off x="948921" y="5403061"/>
+              <a:ext cx="7104863" cy="412995"/>
             </a:xfrm>
             <a:prstGeom prst="rect">
               <a:avLst/>
@@ -13400,6 +13291,77 @@
             </a:p>
           </p:txBody>
         </p:sp>
+        <p:pic>
+          <p:nvPicPr>
+            <p:cNvPr id="12" name="Afbeelding 11" descr="Afbeelding met schermopname, lijn, ruimte, zwart&#10;&#10;Automatisch gegenereerde beschrijving">
+              <a:extLst>
+                <a:ext uri="{FF2B5EF4-FFF2-40B4-BE49-F238E27FC236}">
+                  <a16:creationId xmlns:a16="http://schemas.microsoft.com/office/drawing/2014/main" id="{0E1455E7-D5E9-6F31-1E31-B9EEC3808B71}"/>
+                </a:ext>
+              </a:extLst>
+            </p:cNvPr>
+            <p:cNvPicPr>
+              <a:picLocks noChangeAspect="1"/>
+            </p:cNvPicPr>
+            <p:nvPr/>
+          </p:nvPicPr>
+          <p:blipFill rotWithShape="1">
+            <a:blip r:embed="rId9">
+              <a:extLst>
+                <a:ext uri="{28A0092B-C50C-407E-A947-70E740481C1C}">
+                  <a14:useLocalDpi xmlns:a14="http://schemas.microsoft.com/office/drawing/2010/main" val="0"/>
+                </a:ext>
+              </a:extLst>
+            </a:blip>
+            <a:srcRect b="20471"/>
+            <a:stretch/>
+          </p:blipFill>
+          <p:spPr>
+            <a:xfrm>
+              <a:off x="288090" y="1783819"/>
+              <a:ext cx="10468504" cy="3619241"/>
+            </a:xfrm>
+            <a:prstGeom prst="rect">
+              <a:avLst/>
+            </a:prstGeom>
+          </p:spPr>
+        </p:pic>
+        <p:pic>
+          <p:nvPicPr>
+            <p:cNvPr id="14" name="Afbeelding 13" descr="Afbeelding met schermopname&#10;&#10;Automatisch gegenereerde beschrijving">
+              <a:extLst>
+                <a:ext uri="{FF2B5EF4-FFF2-40B4-BE49-F238E27FC236}">
+                  <a16:creationId xmlns:a16="http://schemas.microsoft.com/office/drawing/2014/main" id="{86523B39-597F-F6B6-35C6-03105F90ADF5}"/>
+                </a:ext>
+              </a:extLst>
+            </p:cNvPr>
+            <p:cNvPicPr>
+              <a:picLocks noChangeAspect="1"/>
+            </p:cNvPicPr>
+            <p:nvPr/>
+          </p:nvPicPr>
+          <p:blipFill>
+            <a:blip r:embed="rId10">
+              <a:extLst>
+                <a:ext uri="{28A0092B-C50C-407E-A947-70E740481C1C}">
+                  <a14:useLocalDpi xmlns:a14="http://schemas.microsoft.com/office/drawing/2010/main" val="0"/>
+                </a:ext>
+              </a:extLst>
+            </a:blip>
+            <a:stretch>
+              <a:fillRect/>
+            </a:stretch>
+          </p:blipFill>
+          <p:spPr>
+            <a:xfrm>
+              <a:off x="285899" y="5798262"/>
+              <a:ext cx="10468504" cy="4084485"/>
+            </a:xfrm>
+            <a:prstGeom prst="rect">
+              <a:avLst/>
+            </a:prstGeom>
+          </p:spPr>
+        </p:pic>
       </p:grpSp>
     </p:spTree>
   </p:cSld>
@@ -13410,7 +13372,7 @@
 </file>
 
 <file path=ppt/slides/slide6.xml><?xml version="1.0" encoding="utf-8"?>
-<p:sld xmlns:a="http://schemas.openxmlformats.org/drawingml/2006/main" xmlns:r="http://schemas.openxmlformats.org/officeDocument/2006/relationships" xmlns:p="http://schemas.openxmlformats.org/presentationml/2006/main">
+<p:sld xmlns:a="http://schemas.openxmlformats.org/drawingml/2006/main" xmlns:r="http://schemas.openxmlformats.org/officeDocument/2006/relationships" xmlns:p="http://schemas.openxmlformats.org/presentationml/2006/main" show="0">
   <p:cSld>
     <p:bg>
       <p:bgPr>

</xml_diff>